<commit_message>
Added my name as the developer
</commit_message>
<xml_diff>
--- a/MyFitnessPresentation.pptx
+++ b/MyFitnessPresentation.pptx
@@ -1054,7 +1054,7 @@
         <a:lstStyle/>
         <a:p>
           <a:r>
-            <a:rPr lang="en-US"/>
+            <a:rPr lang="en-US" dirty="0"/>
             <a:t>Saving meals to a favorites list</a:t>
           </a:r>
         </a:p>
@@ -1090,7 +1090,7 @@
         <a:lstStyle/>
         <a:p>
           <a:r>
-            <a:rPr lang="en-US"/>
+            <a:rPr lang="en-US" dirty="0"/>
             <a:t>Uploading own recipes</a:t>
           </a:r>
         </a:p>
@@ -1126,7 +1126,7 @@
         <a:lstStyle/>
         <a:p>
           <a:r>
-            <a:rPr lang="en-US"/>
+            <a:rPr lang="en-US" dirty="0"/>
             <a:t>Provide more details for fitness centers</a:t>
           </a:r>
         </a:p>
@@ -1162,7 +1162,7 @@
         <a:lstStyle/>
         <a:p>
           <a:r>
-            <a:rPr lang="en-US"/>
+            <a:rPr lang="en-US" dirty="0"/>
             <a:t>Save videos to workouts or individual exercises</a:t>
           </a:r>
         </a:p>
@@ -1611,7 +1611,7 @@
             <a:buNone/>
           </a:pPr>
           <a:r>
-            <a:rPr lang="en-US" sz="2300" kern="1200"/>
+            <a:rPr lang="en-US" sz="2300" kern="1200" dirty="0"/>
             <a:t>Saving meals to a favorites list</a:t>
           </a:r>
         </a:p>
@@ -1759,7 +1759,7 @@
             <a:buNone/>
           </a:pPr>
           <a:r>
-            <a:rPr lang="en-US" sz="2300" kern="1200"/>
+            <a:rPr lang="en-US" sz="2300" kern="1200" dirty="0"/>
             <a:t>Uploading own recipes</a:t>
           </a:r>
         </a:p>
@@ -1907,7 +1907,7 @@
             <a:buNone/>
           </a:pPr>
           <a:r>
-            <a:rPr lang="en-US" sz="2300" kern="1200"/>
+            <a:rPr lang="en-US" sz="2300" kern="1200" dirty="0"/>
             <a:t>Provide more details for fitness centers</a:t>
           </a:r>
         </a:p>
@@ -2055,7 +2055,7 @@
             <a:buNone/>
           </a:pPr>
           <a:r>
-            <a:rPr lang="en-US" sz="2300" kern="1200"/>
+            <a:rPr lang="en-US" sz="2300" kern="1200" dirty="0"/>
             <a:t>Save videos to workouts or individual exercises</a:t>
           </a:r>
         </a:p>
@@ -6727,6 +6727,46 @@
           </a:prstGeom>
         </p:spPr>
       </p:pic>
+      <p:sp>
+        <p:nvSpPr>
+          <p:cNvPr id="6" name="TextBox 5">
+            <a:extLst>
+              <a:ext uri="{FF2B5EF4-FFF2-40B4-BE49-F238E27FC236}">
+                <a16:creationId xmlns:a16="http://schemas.microsoft.com/office/drawing/2014/main" id="{44710C42-5EB1-2747-8C43-F5F76FA3CDB0}"/>
+              </a:ext>
+            </a:extLst>
+          </p:cNvPr>
+          <p:cNvSpPr txBox="1"/>
+          <p:nvPr/>
+        </p:nvSpPr>
+        <p:spPr>
+          <a:xfrm>
+            <a:off x="6857827" y="5109882"/>
+            <a:ext cx="1337022" cy="369332"/>
+          </a:xfrm>
+          <a:prstGeom prst="rect">
+            <a:avLst/>
+          </a:prstGeom>
+          <a:noFill/>
+        </p:spPr>
+        <p:txBody>
+          <a:bodyPr wrap="square" rtlCol="0">
+            <a:spAutoFit/>
+          </a:bodyPr>
+          <a:lstStyle/>
+          <a:p>
+            <a:r>
+              <a:rPr lang="en-US" dirty="0"/>
+              <a:t>John </a:t>
+            </a:r>
+            <a:r>
+              <a:rPr lang="en-US" dirty="0" err="1"/>
+              <a:t>Kouris</a:t>
+            </a:r>
+            <a:endParaRPr lang="en-US" dirty="0"/>
+          </a:p>
+        </p:txBody>
+      </p:sp>
     </p:spTree>
     <p:extLst>
       <p:ext uri="{BB962C8B-B14F-4D97-AF65-F5344CB8AC3E}">
@@ -6816,9 +6856,6 @@
               <a:rPr lang="en-US" dirty="0"/>
               <a:t>Receive recommendations for recipes and fitness centers near you</a:t>
             </a:r>
-          </a:p>
-          <a:p>
-            <a:endParaRPr lang="en-US" dirty="0"/>
           </a:p>
         </p:txBody>
       </p:sp>

</xml_diff>